<commit_message>
Update Project 3 Football App.pptx
</commit_message>
<xml_diff>
--- a/Project 3 Football App.pptx
+++ b/Project 3 Football App.pptx
@@ -5,7 +5,7 @@
     <p:sldMasterId id="2147483695" r:id="rId1"/>
   </p:sldMasterIdLst>
   <p:notesMasterIdLst>
-    <p:notesMasterId r:id="rId12"/>
+    <p:notesMasterId r:id="rId13"/>
   </p:notesMasterIdLst>
   <p:sldIdLst>
     <p:sldId id="256" r:id="rId2"/>
@@ -16,13 +16,14 @@
     <p:sldId id="279" r:id="rId7"/>
     <p:sldId id="280" r:id="rId8"/>
     <p:sldId id="281" r:id="rId9"/>
-    <p:sldId id="282" r:id="rId10"/>
-    <p:sldId id="283" r:id="rId11"/>
+    <p:sldId id="284" r:id="rId10"/>
+    <p:sldId id="282" r:id="rId11"/>
+    <p:sldId id="283" r:id="rId12"/>
   </p:sldIdLst>
   <p:sldSz cx="12192000" cy="6858000"/>
   <p:notesSz cx="6858000" cy="9144000"/>
   <p:custDataLst>
-    <p:tags r:id="rId13"/>
+    <p:tags r:id="rId14"/>
   </p:custDataLst>
   <p:defaultTextStyle>
     <a:defPPr>
@@ -209,7 +210,7 @@
           <a:p>
             <a:fld id="{FFE2DA44-48D8-DB48-82D0-C813EFA52DF5}" type="datetimeFigureOut">
               <a:rPr lang="en-US" smtClean="0"/>
-              <a:t>6/11/23</a:t>
+              <a:t>6/13/23</a:t>
             </a:fld>
             <a:endParaRPr lang="en-US" dirty="0"/>
           </a:p>
@@ -711,7 +712,7 @@
           <a:p>
             <a:fld id="{4CDE23C7-78A4-413A-A84B-93D4CC0A9EB1}" type="datetimeFigureOut">
               <a:rPr lang="en-US" smtClean="0"/>
-              <a:t>6/11/23</a:t>
+              <a:t>6/13/23</a:t>
             </a:fld>
             <a:endParaRPr lang="en-US" dirty="0"/>
           </a:p>
@@ -914,7 +915,7 @@
           <a:p>
             <a:fld id="{4CDE23C7-78A4-413A-A84B-93D4CC0A9EB1}" type="datetimeFigureOut">
               <a:rPr lang="en-US" smtClean="0"/>
-              <a:t>6/11/23</a:t>
+              <a:t>6/13/23</a:t>
             </a:fld>
             <a:endParaRPr lang="en-US" dirty="0"/>
           </a:p>
@@ -1122,7 +1123,7 @@
           <a:p>
             <a:fld id="{4CDE23C7-78A4-413A-A84B-93D4CC0A9EB1}" type="datetimeFigureOut">
               <a:rPr lang="en-US" smtClean="0"/>
-              <a:t>6/11/23</a:t>
+              <a:t>6/13/23</a:t>
             </a:fld>
             <a:endParaRPr lang="en-US" dirty="0"/>
           </a:p>
@@ -1320,7 +1321,7 @@
           <a:p>
             <a:fld id="{4CDE23C7-78A4-413A-A84B-93D4CC0A9EB1}" type="datetimeFigureOut">
               <a:rPr lang="en-US" smtClean="0"/>
-              <a:t>6/11/23</a:t>
+              <a:t>6/13/23</a:t>
             </a:fld>
             <a:endParaRPr lang="en-US" dirty="0"/>
           </a:p>
@@ -1597,7 +1598,7 @@
           <a:p>
             <a:fld id="{4CDE23C7-78A4-413A-A84B-93D4CC0A9EB1}" type="datetimeFigureOut">
               <a:rPr lang="en-US" smtClean="0"/>
-              <a:t>6/11/23</a:t>
+              <a:t>6/13/23</a:t>
             </a:fld>
             <a:endParaRPr lang="en-US" dirty="0"/>
           </a:p>
@@ -1862,7 +1863,7 @@
           <a:p>
             <a:fld id="{4CDE23C7-78A4-413A-A84B-93D4CC0A9EB1}" type="datetimeFigureOut">
               <a:rPr lang="en-US" smtClean="0"/>
-              <a:t>6/11/23</a:t>
+              <a:t>6/13/23</a:t>
             </a:fld>
             <a:endParaRPr lang="en-US" dirty="0"/>
           </a:p>
@@ -2278,7 +2279,7 @@
           <a:p>
             <a:fld id="{4CDE23C7-78A4-413A-A84B-93D4CC0A9EB1}" type="datetimeFigureOut">
               <a:rPr lang="en-US" smtClean="0"/>
-              <a:t>6/11/23</a:t>
+              <a:t>6/13/23</a:t>
             </a:fld>
             <a:endParaRPr lang="en-US" dirty="0"/>
           </a:p>
@@ -2419,7 +2420,7 @@
           <a:p>
             <a:fld id="{4CDE23C7-78A4-413A-A84B-93D4CC0A9EB1}" type="datetimeFigureOut">
               <a:rPr lang="en-US" smtClean="0"/>
-              <a:t>6/11/23</a:t>
+              <a:t>6/13/23</a:t>
             </a:fld>
             <a:endParaRPr lang="en-US" dirty="0"/>
           </a:p>
@@ -2532,7 +2533,7 @@
           <a:p>
             <a:fld id="{4CDE23C7-78A4-413A-A84B-93D4CC0A9EB1}" type="datetimeFigureOut">
               <a:rPr lang="en-US" smtClean="0"/>
-              <a:t>6/11/23</a:t>
+              <a:t>6/13/23</a:t>
             </a:fld>
             <a:endParaRPr lang="en-US" dirty="0"/>
           </a:p>
@@ -2843,7 +2844,7 @@
           <a:p>
             <a:fld id="{4CDE23C7-78A4-413A-A84B-93D4CC0A9EB1}" type="datetimeFigureOut">
               <a:rPr lang="en-US" smtClean="0"/>
-              <a:t>6/11/23</a:t>
+              <a:t>6/13/23</a:t>
             </a:fld>
             <a:endParaRPr lang="en-US" dirty="0"/>
           </a:p>
@@ -3131,7 +3132,7 @@
           <a:p>
             <a:fld id="{4CDE23C7-78A4-413A-A84B-93D4CC0A9EB1}" type="datetimeFigureOut">
               <a:rPr lang="en-US" smtClean="0"/>
-              <a:t>6/11/23</a:t>
+              <a:t>6/13/23</a:t>
             </a:fld>
             <a:endParaRPr lang="en-US" dirty="0"/>
           </a:p>
@@ -3371,7 +3372,7 @@
             <a:fld id="{4CDE23C7-78A4-413A-A84B-93D4CC0A9EB1}" type="datetimeFigureOut">
               <a:rPr lang="en-US" smtClean="0"/>
               <a:pPr/>
-              <a:t>6/11/23</a:t>
+              <a:t>6/13/23</a:t>
             </a:fld>
             <a:endParaRPr lang="en-US" dirty="0"/>
           </a:p>
@@ -4448,6 +4449,120 @@
           <a:p>
             <a:r>
               <a:rPr lang="en-US" dirty="0"/>
+              <a:t>App creation</a:t>
+            </a:r>
+          </a:p>
+        </p:txBody>
+      </p:sp>
+      <p:sp>
+        <p:nvSpPr>
+          <p:cNvPr id="3" name="Content Placeholder 2">
+            <a:extLst>
+              <a:ext uri="{FF2B5EF4-FFF2-40B4-BE49-F238E27FC236}">
+                <a16:creationId xmlns:a16="http://schemas.microsoft.com/office/drawing/2014/main" id="{10B5ECEF-1315-E8CA-4249-2BC0C4FECD71}"/>
+              </a:ext>
+            </a:extLst>
+          </p:cNvPr>
+          <p:cNvSpPr>
+            <a:spLocks noGrp="1"/>
+          </p:cNvSpPr>
+          <p:nvPr>
+            <p:ph idx="1"/>
+          </p:nvPr>
+        </p:nvSpPr>
+        <p:spPr/>
+        <p:txBody>
+          <a:bodyPr>
+            <a:noAutofit/>
+          </a:bodyPr>
+          <a:lstStyle/>
+          <a:p>
+            <a:pPr marL="0" indent="0">
+              <a:buNone/>
+            </a:pPr>
+            <a:r>
+              <a:rPr lang="en-US"/>
+              <a:t>ADD LINK TO THE APP</a:t>
+            </a:r>
+            <a:endParaRPr lang="en-US" dirty="0"/>
+          </a:p>
+          <a:p>
+            <a:pPr lvl="2"/>
+            <a:endParaRPr lang="en-US" sz="1400" dirty="0"/>
+          </a:p>
+          <a:p>
+            <a:pPr marL="274320" lvl="1" indent="0">
+              <a:buNone/>
+            </a:pPr>
+            <a:r>
+              <a:rPr lang="en-US" dirty="0"/>
+              <a:t>					</a:t>
+            </a:r>
+          </a:p>
+          <a:p>
+            <a:pPr marL="274320" lvl="1" indent="0">
+              <a:buNone/>
+            </a:pPr>
+            <a:endParaRPr lang="en-US" dirty="0"/>
+          </a:p>
+        </p:txBody>
+      </p:sp>
+    </p:spTree>
+    <p:custDataLst>
+      <p:tags r:id="rId1"/>
+    </p:custDataLst>
+    <p:extLst>
+      <p:ext uri="{BB962C8B-B14F-4D97-AF65-F5344CB8AC3E}">
+        <p14:creationId xmlns:p14="http://schemas.microsoft.com/office/powerpoint/2010/main" val="624436294"/>
+      </p:ext>
+    </p:extLst>
+  </p:cSld>
+  <p:clrMapOvr>
+    <a:masterClrMapping/>
+  </p:clrMapOvr>
+</p:sld>
+</file>
+
+<file path=ppt/slides/slide11.xml><?xml version="1.0" encoding="utf-8"?>
+<p:sld xmlns:a="http://schemas.openxmlformats.org/drawingml/2006/main" xmlns:r="http://schemas.openxmlformats.org/officeDocument/2006/relationships" xmlns:p="http://schemas.openxmlformats.org/presentationml/2006/main">
+  <p:cSld>
+    <p:spTree>
+      <p:nvGrpSpPr>
+        <p:cNvPr id="1" name=""/>
+        <p:cNvGrpSpPr/>
+        <p:nvPr/>
+      </p:nvGrpSpPr>
+      <p:grpSpPr>
+        <a:xfrm>
+          <a:off x="0" y="0"/>
+          <a:ext cx="0" cy="0"/>
+          <a:chOff x="0" y="0"/>
+          <a:chExt cx="0" cy="0"/>
+        </a:xfrm>
+      </p:grpSpPr>
+      <p:sp>
+        <p:nvSpPr>
+          <p:cNvPr id="2" name="Title 1">
+            <a:extLst>
+              <a:ext uri="{FF2B5EF4-FFF2-40B4-BE49-F238E27FC236}">
+                <a16:creationId xmlns:a16="http://schemas.microsoft.com/office/drawing/2014/main" id="{F43000C6-2655-99E0-5A5D-D6A8A41E4E0D}"/>
+              </a:ext>
+            </a:extLst>
+          </p:cNvPr>
+          <p:cNvSpPr>
+            <a:spLocks noGrp="1"/>
+          </p:cNvSpPr>
+          <p:nvPr>
+            <p:ph type="title"/>
+          </p:nvPr>
+        </p:nvSpPr>
+        <p:spPr/>
+        <p:txBody>
+          <a:bodyPr/>
+          <a:lstStyle/>
+          <a:p>
+            <a:r>
+              <a:rPr lang="en-US" dirty="0"/>
               <a:t>Conclusions</a:t>
             </a:r>
           </a:p>
@@ -5538,8 +5653,10 @@
             </a:r>
           </a:p>
           <a:p>
-            <a:pPr lvl="2"/>
-            <a:endParaRPr lang="en-US" sz="1400" dirty="0"/>
+            <a:r>
+              <a:rPr lang="en-US" sz="1800" dirty="0"/>
+              <a:t>For the custom marker an image was added to the html and called with the following code</a:t>
+            </a:r>
           </a:p>
           <a:p>
             <a:pPr marL="274320" lvl="1" indent="0">
@@ -5547,7 +5664,100 @@
             </a:pPr>
             <a:r>
               <a:rPr lang="en-US" dirty="0"/>
-              <a:t>					</a:t>
+              <a:t> var </a:t>
+            </a:r>
+            <a:r>
+              <a:rPr lang="en-US" dirty="0" err="1">
+                <a:highlight>
+                  <a:srgbClr val="FFFF00"/>
+                </a:highlight>
+              </a:rPr>
+              <a:t>soccerIcon</a:t>
+            </a:r>
+            <a:r>
+              <a:rPr lang="en-US" dirty="0"/>
+              <a:t> = </a:t>
+            </a:r>
+            <a:r>
+              <a:rPr lang="en-US" dirty="0" err="1"/>
+              <a:t>L.icon</a:t>
+            </a:r>
+            <a:r>
+              <a:rPr lang="en-US" dirty="0"/>
+              <a:t>({ </a:t>
+            </a:r>
+            <a:r>
+              <a:rPr lang="en-US" dirty="0" err="1"/>
+              <a:t>iconUrl</a:t>
+            </a:r>
+            <a:r>
+              <a:rPr lang="en-US" dirty="0"/>
+              <a:t>: 'static/</a:t>
+            </a:r>
+            <a:r>
+              <a:rPr lang="en-US" dirty="0" err="1"/>
+              <a:t>football_marker.png</a:t>
+            </a:r>
+            <a:r>
+              <a:rPr lang="en-US" dirty="0"/>
+              <a:t>', </a:t>
+            </a:r>
+            <a:r>
+              <a:rPr lang="en-US" dirty="0" err="1"/>
+              <a:t>iconSize</a:t>
+            </a:r>
+            <a:r>
+              <a:rPr lang="en-US" dirty="0"/>
+              <a:t>: [50, 50],});</a:t>
+            </a:r>
+          </a:p>
+          <a:p>
+            <a:pPr marL="274320" lvl="1" indent="0">
+              <a:buNone/>
+            </a:pPr>
+            <a:r>
+              <a:rPr lang="en-US" dirty="0" err="1"/>
+              <a:t>L.marker</a:t>
+            </a:r>
+            <a:r>
+              <a:rPr lang="en-US" dirty="0"/>
+              <a:t>((</a:t>
+            </a:r>
+            <a:r>
+              <a:rPr lang="en-US" dirty="0" err="1"/>
+              <a:t>stadCoords</a:t>
+            </a:r>
+            <a:r>
+              <a:rPr lang="en-US" dirty="0">
+                <a:highlight>
+                  <a:srgbClr val="FFFF00"/>
+                </a:highlight>
+              </a:rPr>
+              <a:t>),{icon: </a:t>
+            </a:r>
+            <a:r>
+              <a:rPr lang="en-US" dirty="0" err="1">
+                <a:highlight>
+                  <a:srgbClr val="FFFF00"/>
+                </a:highlight>
+              </a:rPr>
+              <a:t>soccerIcon</a:t>
+            </a:r>
+            <a:r>
+              <a:rPr lang="en-US" dirty="0">
+                <a:highlight>
+                  <a:srgbClr val="FFFF00"/>
+                </a:highlight>
+              </a:rPr>
+              <a:t>}).</a:t>
+            </a:r>
+            <a:r>
+              <a:rPr lang="en-US" dirty="0" err="1"/>
+              <a:t>bindPopup</a:t>
+            </a:r>
+            <a:r>
+              <a:rPr lang="en-US" dirty="0"/>
+              <a:t> 					</a:t>
             </a:r>
           </a:p>
           <a:p>
@@ -5580,7 +5790,7 @@
         </p:blipFill>
         <p:spPr>
           <a:xfrm>
-            <a:off x="8940800" y="2806700"/>
+            <a:off x="9570387" y="2806700"/>
             <a:ext cx="3251200" cy="3251200"/>
           </a:xfrm>
           <a:prstGeom prst="rect">
@@ -5643,10 +5853,13 @@
           <a:lstStyle/>
           <a:p>
             <a:r>
-              <a:rPr lang="en-US"/>
+              <a:rPr lang="en-US" dirty="0" err="1"/>
               <a:t>Plotly</a:t>
             </a:r>
-            <a:endParaRPr lang="en-US" dirty="0"/>
+            <a:r>
+              <a:rPr lang="en-US" dirty="0"/>
+              <a:t> - Sunburst</a:t>
+            </a:r>
           </a:p>
         </p:txBody>
       </p:sp>
@@ -5666,37 +5879,341 @@
             <p:ph idx="1"/>
           </p:nvPr>
         </p:nvSpPr>
-        <p:spPr/>
+        <p:spPr>
+          <a:xfrm>
+            <a:off x="548638" y="1495053"/>
+            <a:ext cx="10995660" cy="4830796"/>
+          </a:xfrm>
+        </p:spPr>
         <p:txBody>
           <a:bodyPr>
             <a:noAutofit/>
           </a:bodyPr>
           <a:lstStyle/>
           <a:p>
-            <a:pPr marL="0" indent="0">
+            <a:pPr marL="72000" lvl="1" indent="0">
+              <a:lnSpc>
+                <a:spcPct val="100000"/>
+              </a:lnSpc>
+              <a:spcBef>
+                <a:spcPts val="0"/>
+              </a:spcBef>
               <a:buNone/>
             </a:pPr>
             <a:r>
-              <a:rPr lang="en-US" dirty="0"/>
-              <a:t>Sunburst Plot</a:t>
-            </a:r>
-          </a:p>
-          <a:p>
-            <a:pPr lvl="1"/>
-            <a:r>
-              <a:rPr lang="en-CA" b="0" i="0" dirty="0">
-                <a:solidFill>
-                  <a:srgbClr val="202124"/>
-                </a:solidFill>
-                <a:effectLst/>
-              </a:rPr>
-              <a:t>Displays the country, team and player goals</a:t>
-            </a:r>
-          </a:p>
-          <a:p>
-            <a:pPr marL="274320" lvl="1" indent="0">
+              <a:rPr lang="en-CA" dirty="0"/>
+              <a:t>values = [] </a:t>
+            </a:r>
+          </a:p>
+          <a:p>
+            <a:pPr marL="72000" lvl="1" indent="0">
+              <a:lnSpc>
+                <a:spcPct val="100000"/>
+              </a:lnSpc>
+              <a:spcBef>
+                <a:spcPts val="0"/>
+              </a:spcBef>
               <a:buNone/>
             </a:pPr>
+            <a:r>
+              <a:rPr lang="en-CA" dirty="0"/>
+              <a:t>labels = [] </a:t>
+            </a:r>
+          </a:p>
+          <a:p>
+            <a:pPr marL="72000" lvl="1" indent="0">
+              <a:lnSpc>
+                <a:spcPct val="100000"/>
+              </a:lnSpc>
+              <a:spcBef>
+                <a:spcPts val="0"/>
+              </a:spcBef>
+              <a:buNone/>
+            </a:pPr>
+            <a:r>
+              <a:rPr lang="en-CA" dirty="0"/>
+              <a:t>parents = [] </a:t>
+            </a:r>
+          </a:p>
+          <a:p>
+            <a:pPr marL="72000" lvl="1" indent="0">
+              <a:spcBef>
+                <a:spcPts val="0"/>
+              </a:spcBef>
+              <a:buNone/>
+            </a:pPr>
+            <a:r>
+              <a:rPr lang="en-CA" dirty="0"/>
+              <a:t>for league in leagues: </a:t>
+            </a:r>
+          </a:p>
+          <a:p>
+            <a:pPr marL="72000" lvl="1" indent="0">
+              <a:spcBef>
+                <a:spcPts val="0"/>
+              </a:spcBef>
+              <a:buNone/>
+            </a:pPr>
+            <a:r>
+              <a:rPr lang="en-CA" dirty="0"/>
+              <a:t>	</a:t>
+            </a:r>
+            <a:r>
+              <a:rPr lang="en-CA" dirty="0" err="1"/>
+              <a:t>values.push</a:t>
+            </a:r>
+            <a:r>
+              <a:rPr lang="en-CA" dirty="0"/>
+              <a:t>(</a:t>
+            </a:r>
+            <a:r>
+              <a:rPr lang="en-CA" dirty="0" err="1"/>
+              <a:t>league.goals</a:t>
+            </a:r>
+            <a:r>
+              <a:rPr lang="en-CA" dirty="0"/>
+              <a:t>) </a:t>
+            </a:r>
+          </a:p>
+          <a:p>
+            <a:pPr marL="72000" lvl="1" indent="0">
+              <a:spcBef>
+                <a:spcPts val="0"/>
+              </a:spcBef>
+              <a:buNone/>
+            </a:pPr>
+            <a:r>
+              <a:rPr lang="en-CA" dirty="0"/>
+              <a:t>	</a:t>
+            </a:r>
+            <a:r>
+              <a:rPr lang="en-CA" dirty="0" err="1"/>
+              <a:t>Labels.push</a:t>
+            </a:r>
+            <a:r>
+              <a:rPr lang="en-CA" dirty="0"/>
+              <a:t>(</a:t>
+            </a:r>
+            <a:r>
+              <a:rPr lang="en-CA" dirty="0" err="1"/>
+              <a:t>League.name</a:t>
+            </a:r>
+            <a:r>
+              <a:rPr lang="en-CA" dirty="0"/>
+              <a:t>) </a:t>
+            </a:r>
+          </a:p>
+          <a:p>
+            <a:pPr marL="72000" lvl="1" indent="0">
+              <a:spcBef>
+                <a:spcPts val="0"/>
+              </a:spcBef>
+              <a:buNone/>
+            </a:pPr>
+            <a:r>
+              <a:rPr lang="en-CA" dirty="0"/>
+              <a:t>	</a:t>
+            </a:r>
+            <a:r>
+              <a:rPr lang="en-CA" dirty="0" err="1"/>
+              <a:t>parents.push</a:t>
+            </a:r>
+            <a:r>
+              <a:rPr lang="en-CA" dirty="0"/>
+              <a:t>("") </a:t>
+            </a:r>
+          </a:p>
+          <a:p>
+            <a:pPr marL="72000" lvl="1" indent="0">
+              <a:spcBef>
+                <a:spcPts val="0"/>
+              </a:spcBef>
+              <a:buNone/>
+            </a:pPr>
+            <a:r>
+              <a:rPr lang="en-CA" dirty="0"/>
+              <a:t>	For team in league: </a:t>
+            </a:r>
+          </a:p>
+          <a:p>
+            <a:pPr marL="72000" lvl="1" indent="0">
+              <a:spcBef>
+                <a:spcPts val="0"/>
+              </a:spcBef>
+              <a:buNone/>
+            </a:pPr>
+            <a:r>
+              <a:rPr lang="en-CA" dirty="0"/>
+              <a:t>		</a:t>
+            </a:r>
+            <a:r>
+              <a:rPr lang="en-CA" dirty="0" err="1"/>
+              <a:t>values.push</a:t>
+            </a:r>
+            <a:r>
+              <a:rPr lang="en-CA" dirty="0"/>
+              <a:t>(</a:t>
+            </a:r>
+            <a:r>
+              <a:rPr lang="en-CA" dirty="0" err="1"/>
+              <a:t>team.goals</a:t>
+            </a:r>
+            <a:r>
+              <a:rPr lang="en-CA" dirty="0"/>
+              <a:t>) </a:t>
+            </a:r>
+          </a:p>
+          <a:p>
+            <a:pPr marL="72000" lvl="1" indent="0">
+              <a:spcBef>
+                <a:spcPts val="0"/>
+              </a:spcBef>
+              <a:buNone/>
+            </a:pPr>
+            <a:r>
+              <a:rPr lang="en-CA" dirty="0"/>
+              <a:t>		</a:t>
+            </a:r>
+            <a:r>
+              <a:rPr lang="en-CA" dirty="0" err="1"/>
+              <a:t>labels.push</a:t>
+            </a:r>
+            <a:r>
+              <a:rPr lang="en-CA" dirty="0"/>
+              <a:t>(</a:t>
+            </a:r>
+            <a:r>
+              <a:rPr lang="en-CA" dirty="0" err="1"/>
+              <a:t>team.name</a:t>
+            </a:r>
+            <a:r>
+              <a:rPr lang="en-CA" dirty="0"/>
+              <a:t>) </a:t>
+            </a:r>
+          </a:p>
+          <a:p>
+            <a:pPr marL="72000" lvl="1" indent="0">
+              <a:spcBef>
+                <a:spcPts val="0"/>
+              </a:spcBef>
+              <a:buNone/>
+            </a:pPr>
+            <a:r>
+              <a:rPr lang="en-CA" dirty="0"/>
+              <a:t>		</a:t>
+            </a:r>
+            <a:r>
+              <a:rPr lang="en-CA" dirty="0" err="1"/>
+              <a:t>parents.push</a:t>
+            </a:r>
+            <a:r>
+              <a:rPr lang="en-CA" dirty="0"/>
+              <a:t>(</a:t>
+            </a:r>
+            <a:r>
+              <a:rPr lang="en-CA" dirty="0" err="1"/>
+              <a:t>league.name</a:t>
+            </a:r>
+            <a:r>
+              <a:rPr lang="en-CA" dirty="0"/>
+              <a:t>) </a:t>
+            </a:r>
+          </a:p>
+          <a:p>
+            <a:pPr marL="72000" lvl="1" indent="0">
+              <a:spcBef>
+                <a:spcPts val="0"/>
+              </a:spcBef>
+              <a:buNone/>
+            </a:pPr>
+            <a:r>
+              <a:rPr lang="en-CA" dirty="0"/>
+              <a:t>		for player in team: </a:t>
+            </a:r>
+          </a:p>
+          <a:p>
+            <a:pPr marL="72000" lvl="1" indent="0">
+              <a:spcBef>
+                <a:spcPts val="0"/>
+              </a:spcBef>
+              <a:buNone/>
+            </a:pPr>
+            <a:r>
+              <a:rPr lang="en-CA" dirty="0"/>
+              <a:t>			</a:t>
+            </a:r>
+            <a:r>
+              <a:rPr lang="en-CA" dirty="0" err="1"/>
+              <a:t>values.push</a:t>
+            </a:r>
+            <a:r>
+              <a:rPr lang="en-CA" dirty="0"/>
+              <a:t>(</a:t>
+            </a:r>
+            <a:r>
+              <a:rPr lang="en-CA" dirty="0" err="1"/>
+              <a:t>player.goals</a:t>
+            </a:r>
+            <a:r>
+              <a:rPr lang="en-CA" dirty="0"/>
+              <a:t>) </a:t>
+            </a:r>
+          </a:p>
+          <a:p>
+            <a:pPr marL="72000" lvl="1" indent="0">
+              <a:spcBef>
+                <a:spcPts val="0"/>
+              </a:spcBef>
+              <a:buNone/>
+            </a:pPr>
+            <a:r>
+              <a:rPr lang="en-CA" dirty="0"/>
+              <a:t>			</a:t>
+            </a:r>
+            <a:r>
+              <a:rPr lang="en-CA" dirty="0" err="1"/>
+              <a:t>labels.push</a:t>
+            </a:r>
+            <a:r>
+              <a:rPr lang="en-CA" dirty="0"/>
+              <a:t>(</a:t>
+            </a:r>
+            <a:r>
+              <a:rPr lang="en-CA" dirty="0" err="1"/>
+              <a:t>player.name</a:t>
+            </a:r>
+            <a:r>
+              <a:rPr lang="en-CA" dirty="0"/>
+              <a:t>) </a:t>
+            </a:r>
+          </a:p>
+          <a:p>
+            <a:pPr marL="72000" lvl="1" indent="0">
+              <a:spcBef>
+                <a:spcPts val="0"/>
+              </a:spcBef>
+              <a:buNone/>
+            </a:pPr>
+            <a:r>
+              <a:rPr lang="en-CA" dirty="0"/>
+              <a:t>			</a:t>
+            </a:r>
+            <a:r>
+              <a:rPr lang="en-CA" dirty="0" err="1"/>
+              <a:t>parents.push</a:t>
+            </a:r>
+            <a:r>
+              <a:rPr lang="en-CA" dirty="0"/>
+              <a:t>(</a:t>
+            </a:r>
+            <a:r>
+              <a:rPr lang="en-CA" dirty="0" err="1"/>
+              <a:t>team.name</a:t>
+            </a:r>
+            <a:r>
+              <a:rPr lang="en-CA" dirty="0"/>
+              <a:t>)</a:t>
+            </a:r>
             <a:endParaRPr lang="en-CA" dirty="0">
               <a:solidFill>
                 <a:srgbClr val="202124"/>
@@ -5708,22 +6225,6 @@
               <a:buNone/>
             </a:pPr>
             <a:endParaRPr lang="en-US" dirty="0"/>
-          </a:p>
-          <a:p>
-            <a:pPr marL="0" indent="0">
-              <a:buNone/>
-            </a:pPr>
-            <a:r>
-              <a:rPr lang="en-US" dirty="0"/>
-              <a:t>Bar chart with Line Plot</a:t>
-            </a:r>
-          </a:p>
-          <a:p>
-            <a:pPr lvl="1"/>
-            <a:r>
-              <a:rPr lang="en-US" dirty="0"/>
-              <a:t>Displays Team points on the bars with wages on the line plot</a:t>
-            </a:r>
           </a:p>
           <a:p>
             <a:endParaRPr lang="en-US" dirty="0"/>
@@ -5770,8 +6271,8 @@
         </p:blipFill>
         <p:spPr>
           <a:xfrm>
-            <a:off x="8983503" y="950976"/>
-            <a:ext cx="2340000" cy="2340000"/>
+            <a:off x="8828829" y="846045"/>
+            <a:ext cx="2988972" cy="2988972"/>
           </a:xfrm>
           <a:prstGeom prst="rect">
             <a:avLst/>
@@ -5780,15 +6281,15 @@
       </p:pic>
       <p:pic>
         <p:nvPicPr>
-          <p:cNvPr id="7" name="Picture 6" descr="Chart&#10;&#10;Description automatically generated">
-            <a:extLst>
-              <a:ext uri="{FF2B5EF4-FFF2-40B4-BE49-F238E27FC236}">
-                <a16:creationId xmlns:a16="http://schemas.microsoft.com/office/drawing/2014/main" id="{D26939BF-D9F4-3E11-4ECC-98949184EE3F}"/>
+          <p:cNvPr id="8" name="Picture 7">
+            <a:extLst>
+              <a:ext uri="{FF2B5EF4-FFF2-40B4-BE49-F238E27FC236}">
+                <a16:creationId xmlns:a16="http://schemas.microsoft.com/office/drawing/2014/main" id="{B08DA05C-E651-130E-57C8-8DA931670564}"/>
               </a:ext>
             </a:extLst>
           </p:cNvPr>
           <p:cNvPicPr>
-            <a:picLocks noChangeAspect="1"/>
+            <a:picLocks/>
           </p:cNvPicPr>
           <p:nvPr/>
         </p:nvPicPr>
@@ -5800,8 +6301,8 @@
         </p:blipFill>
         <p:spPr>
           <a:xfrm>
-            <a:off x="8983503" y="3844925"/>
-            <a:ext cx="2340000" cy="2340000"/>
+            <a:off x="8704289" y="3835017"/>
+            <a:ext cx="2988000" cy="2988000"/>
           </a:xfrm>
           <a:prstGeom prst="rect">
             <a:avLst/>
@@ -5863,9 +6364,18 @@
           <a:lstStyle/>
           <a:p>
             <a:r>
-              <a:rPr lang="en-US" dirty="0"/>
-              <a:t>App creation</a:t>
-            </a:r>
+              <a:rPr lang="en-US" dirty="0" err="1"/>
+              <a:t>Plotly</a:t>
+            </a:r>
+            <a:r>
+              <a:rPr lang="en-US" dirty="0"/>
+              <a:t> – Bar char with Line </a:t>
+            </a:r>
+            <a:r>
+              <a:rPr lang="en-US" dirty="0" err="1"/>
+              <a:t>Pliot</a:t>
+            </a:r>
+            <a:endParaRPr lang="en-US" dirty="0"/>
           </a:p>
         </p:txBody>
       </p:sp>
@@ -5885,7 +6395,12 @@
             <p:ph idx="1"/>
           </p:nvPr>
         </p:nvSpPr>
-        <p:spPr/>
+        <p:spPr>
+          <a:xfrm>
+            <a:off x="548641" y="1499016"/>
+            <a:ext cx="10995660" cy="4558884"/>
+          </a:xfrm>
+        </p:spPr>
         <p:txBody>
           <a:bodyPr>
             <a:noAutofit/>
@@ -5896,14 +6411,15 @@
               <a:buNone/>
             </a:pPr>
             <a:r>
-              <a:rPr lang="en-US"/>
-              <a:t>ADD LINK TO THE APP</a:t>
-            </a:r>
+              <a:rPr lang="en-US" dirty="0"/>
+              <a:t>Displays Team points on the bars with wages on the line plot</a:t>
+            </a:r>
+          </a:p>
+          <a:p>
             <a:endParaRPr lang="en-US" dirty="0"/>
           </a:p>
           <a:p>
-            <a:pPr lvl="2"/>
-            <a:endParaRPr lang="en-US" sz="1400" dirty="0"/>
+            <a:endParaRPr lang="en-US" dirty="0"/>
           </a:p>
           <a:p>
             <a:pPr marL="274320" lvl="1" indent="0">
@@ -5922,13 +6438,43 @@
           </a:p>
         </p:txBody>
       </p:sp>
+      <p:pic>
+        <p:nvPicPr>
+          <p:cNvPr id="7" name="Picture 6" descr="Chart&#10;&#10;Description automatically generated">
+            <a:extLst>
+              <a:ext uri="{FF2B5EF4-FFF2-40B4-BE49-F238E27FC236}">
+                <a16:creationId xmlns:a16="http://schemas.microsoft.com/office/drawing/2014/main" id="{D26939BF-D9F4-3E11-4ECC-98949184EE3F}"/>
+              </a:ext>
+            </a:extLst>
+          </p:cNvPr>
+          <p:cNvPicPr>
+            <a:picLocks noChangeAspect="1"/>
+          </p:cNvPicPr>
+          <p:nvPr/>
+        </p:nvPicPr>
+        <p:blipFill>
+          <a:blip r:embed="rId3"/>
+          <a:stretch>
+            <a:fillRect/>
+          </a:stretch>
+        </p:blipFill>
+        <p:spPr>
+          <a:xfrm>
+            <a:off x="7167403" y="2028825"/>
+            <a:ext cx="4156100" cy="4156100"/>
+          </a:xfrm>
+          <a:prstGeom prst="rect">
+            <a:avLst/>
+          </a:prstGeom>
+        </p:spPr>
+      </p:pic>
     </p:spTree>
     <p:custDataLst>
       <p:tags r:id="rId1"/>
     </p:custDataLst>
     <p:extLst>
       <p:ext uri="{BB962C8B-B14F-4D97-AF65-F5344CB8AC3E}">
-        <p14:creationId xmlns:p14="http://schemas.microsoft.com/office/powerpoint/2010/main" val="624436294"/>
+        <p14:creationId xmlns:p14="http://schemas.microsoft.com/office/powerpoint/2010/main" val="2606083421"/>
       </p:ext>
     </p:extLst>
   </p:cSld>
@@ -5955,6 +6501,12 @@
 </file>
 
 <file path=ppt/tags/tag11.xml><?xml version="1.0" encoding="utf-8"?>
+<p:tagLst xmlns:a="http://schemas.openxmlformats.org/drawingml/2006/main" xmlns:r="http://schemas.openxmlformats.org/officeDocument/2006/relationships" xmlns:p="http://schemas.openxmlformats.org/presentationml/2006/main">
+  <p:tag name="ARTICULATE_SLIDE_THUMBNAIL_REFRESH" val="1"/>
+</p:tagLst>
+</file>
+
+<file path=ppt/tags/tag12.xml><?xml version="1.0" encoding="utf-8"?>
 <p:tagLst xmlns:a="http://schemas.openxmlformats.org/drawingml/2006/main" xmlns:r="http://schemas.openxmlformats.org/officeDocument/2006/relationships" xmlns:p="http://schemas.openxmlformats.org/presentationml/2006/main">
   <p:tag name="ARTICULATE_SLIDE_THUMBNAIL_REFRESH" val="1"/>
 </p:tagLst>

</xml_diff>